<commit_message>
zusätzliche Expert Übung für Javascript in HTML
</commit_message>
<xml_diff>
--- a/7. Javascript/Slides/DOM.pptx
+++ b/7. Javascript/Slides/DOM.pptx
@@ -22,7 +22,8 @@
     <p:sldId id="428" r:id="rId16"/>
     <p:sldId id="431" r:id="rId17"/>
     <p:sldId id="432" r:id="rId18"/>
-    <p:sldId id="292" r:id="rId19"/>
+    <p:sldId id="433" r:id="rId19"/>
+    <p:sldId id="292" r:id="rId20"/>
   </p:sldIdLst>
   <p:sldSz cx="12192000" cy="6858000"/>
   <p:notesSz cx="6858000" cy="9144000"/>
@@ -280,7 +281,7 @@
           <a:p>
             <a:fld id="{B6D41BCC-AD73-4203-A5A6-E62EB28B0FE6}" type="datetimeFigureOut">
               <a:rPr lang="en-US" smtClean="0"/>
-              <a:t>11/24/2023</a:t>
+              <a:t>11/25/2023</a:t>
             </a:fld>
             <a:endParaRPr lang="en-US"/>
           </a:p>
@@ -488,7 +489,7 @@
           <a:p>
             <a:fld id="{B6D41BCC-AD73-4203-A5A6-E62EB28B0FE6}" type="datetimeFigureOut">
               <a:rPr lang="en-US" smtClean="0"/>
-              <a:t>11/24/2023</a:t>
+              <a:t>11/25/2023</a:t>
             </a:fld>
             <a:endParaRPr lang="en-US"/>
           </a:p>
@@ -696,7 +697,7 @@
           <a:p>
             <a:fld id="{B6D41BCC-AD73-4203-A5A6-E62EB28B0FE6}" type="datetimeFigureOut">
               <a:rPr lang="en-US" smtClean="0"/>
-              <a:t>11/24/2023</a:t>
+              <a:t>11/25/2023</a:t>
             </a:fld>
             <a:endParaRPr lang="en-US"/>
           </a:p>
@@ -894,7 +895,7 @@
           <a:p>
             <a:fld id="{B6D41BCC-AD73-4203-A5A6-E62EB28B0FE6}" type="datetimeFigureOut">
               <a:rPr lang="en-US" smtClean="0"/>
-              <a:t>11/24/2023</a:t>
+              <a:t>11/25/2023</a:t>
             </a:fld>
             <a:endParaRPr lang="en-US"/>
           </a:p>
@@ -1303,7 +1304,7 @@
           <a:p>
             <a:fld id="{B6D41BCC-AD73-4203-A5A6-E62EB28B0FE6}" type="datetimeFigureOut">
               <a:rPr lang="en-US" smtClean="0"/>
-              <a:t>11/24/2023</a:t>
+              <a:t>11/25/2023</a:t>
             </a:fld>
             <a:endParaRPr lang="en-US"/>
           </a:p>
@@ -1573,7 +1574,7 @@
           <a:p>
             <a:fld id="{B6D41BCC-AD73-4203-A5A6-E62EB28B0FE6}" type="datetimeFigureOut">
               <a:rPr lang="en-US" smtClean="0"/>
-              <a:t>11/24/2023</a:t>
+              <a:t>11/25/2023</a:t>
             </a:fld>
             <a:endParaRPr lang="en-US"/>
           </a:p>
@@ -1989,7 +1990,7 @@
           <a:p>
             <a:fld id="{B6D41BCC-AD73-4203-A5A6-E62EB28B0FE6}" type="datetimeFigureOut">
               <a:rPr lang="en-US" smtClean="0"/>
-              <a:t>11/24/2023</a:t>
+              <a:t>11/25/2023</a:t>
             </a:fld>
             <a:endParaRPr lang="en-US"/>
           </a:p>
@@ -2130,7 +2131,7 @@
           <a:p>
             <a:fld id="{B6D41BCC-AD73-4203-A5A6-E62EB28B0FE6}" type="datetimeFigureOut">
               <a:rPr lang="en-US" smtClean="0"/>
-              <a:t>11/24/2023</a:t>
+              <a:t>11/25/2023</a:t>
             </a:fld>
             <a:endParaRPr lang="en-US"/>
           </a:p>
@@ -2243,7 +2244,7 @@
           <a:p>
             <a:fld id="{B6D41BCC-AD73-4203-A5A6-E62EB28B0FE6}" type="datetimeFigureOut">
               <a:rPr lang="en-US" smtClean="0"/>
-              <a:t>11/24/2023</a:t>
+              <a:t>11/25/2023</a:t>
             </a:fld>
             <a:endParaRPr lang="en-US"/>
           </a:p>
@@ -2569,7 +2570,7 @@
           <a:p>
             <a:fld id="{B6D41BCC-AD73-4203-A5A6-E62EB28B0FE6}" type="datetimeFigureOut">
               <a:rPr lang="en-US" smtClean="0"/>
-              <a:t>11/24/2023</a:t>
+              <a:t>11/25/2023</a:t>
             </a:fld>
             <a:endParaRPr lang="en-US"/>
           </a:p>
@@ -2857,7 +2858,7 @@
           <a:p>
             <a:fld id="{B6D41BCC-AD73-4203-A5A6-E62EB28B0FE6}" type="datetimeFigureOut">
               <a:rPr lang="en-US" smtClean="0"/>
-              <a:t>11/24/2023</a:t>
+              <a:t>11/25/2023</a:t>
             </a:fld>
             <a:endParaRPr lang="en-US"/>
           </a:p>
@@ -3097,7 +3098,7 @@
             <a:fld id="{B6D41BCC-AD73-4203-A5A6-E62EB28B0FE6}" type="datetimeFigureOut">
               <a:rPr lang="en-US" smtClean="0"/>
               <a:pPr/>
-              <a:t>11/24/2023</a:t>
+              <a:t>11/25/2023</a:t>
             </a:fld>
             <a:endParaRPr lang="en-US"/>
           </a:p>
@@ -3571,7 +3572,7 @@
                 <a16:creationId xmlns:a16="http://schemas.microsoft.com/office/drawing/2014/main" id="{BE229233-9672-4675-99B7-6CBCEF1CD415}"/>
               </a:ext>
               <a:ext uri="{C183D7F6-B498-43B3-948B-1728B52AA6E4}">
-                <adec:decorative xmlns:adec="http://schemas.microsoft.com/office/drawing/2017/decorative" xmlns="" val="1"/>
+                <adec:decorative xmlns="" xmlns:adec="http://schemas.microsoft.com/office/drawing/2017/decorative" val="1"/>
               </a:ext>
             </a:extLst>
           </p:cNvPr>
@@ -3666,7 +3667,7 @@
                 <a16:creationId xmlns:a16="http://schemas.microsoft.com/office/drawing/2014/main" id="{EC5FF010-B53C-46BE-BEEF-AF926A00F67F}"/>
               </a:ext>
               <a:ext uri="{C183D7F6-B498-43B3-948B-1728B52AA6E4}">
-                <adec:decorative xmlns:adec="http://schemas.microsoft.com/office/drawing/2017/decorative" xmlns="" val="1"/>
+                <adec:decorative xmlns="" xmlns:adec="http://schemas.microsoft.com/office/drawing/2017/decorative" val="1"/>
               </a:ext>
             </a:extLst>
           </p:cNvPr>
@@ -3732,7 +3733,7 @@
                 <a16:creationId xmlns:a16="http://schemas.microsoft.com/office/drawing/2014/main" id="{8509AD9C-1F43-4138-A72B-8CA988EDD475}"/>
               </a:ext>
               <a:ext uri="{C183D7F6-B498-43B3-948B-1728B52AA6E4}">
-                <adec:decorative xmlns:adec="http://schemas.microsoft.com/office/drawing/2017/decorative" xmlns="" val="1"/>
+                <adec:decorative xmlns="" xmlns:adec="http://schemas.microsoft.com/office/drawing/2017/decorative" val="1"/>
               </a:ext>
             </a:extLst>
           </p:cNvPr>
@@ -3881,6 +3882,13 @@
   <p:clrMapOvr>
     <a:masterClrMapping/>
   </p:clrMapOvr>
+  <p:timing>
+    <p:tnLst>
+      <p:par>
+        <p:cTn id="1" dur="indefinite" restart="never" nodeType="tmRoot"/>
+      </p:par>
+    </p:tnLst>
+  </p:timing>
 </p:sld>
 </file>
 
@@ -4647,6 +4655,13 @@
   <p:clrMapOvr>
     <a:masterClrMapping/>
   </p:clrMapOvr>
+  <p:timing>
+    <p:tnLst>
+      <p:par>
+        <p:cTn id="1" dur="indefinite" restart="never" nodeType="tmRoot"/>
+      </p:par>
+    </p:tnLst>
+  </p:timing>
 </p:sld>
 </file>
 
@@ -7836,6 +7851,196 @@
       </p:grpSpPr>
       <p:sp>
         <p:nvSpPr>
+          <p:cNvPr id="2" name="Titel 1"/>
+          <p:cNvSpPr>
+            <a:spLocks noGrp="1"/>
+          </p:cNvSpPr>
+          <p:nvPr>
+            <p:ph type="title"/>
+          </p:nvPr>
+        </p:nvSpPr>
+        <p:spPr/>
+        <p:txBody>
+          <a:bodyPr/>
+          <a:lstStyle/>
+          <a:p>
+            <a:r>
+              <a:rPr lang="de-AT" dirty="0" smtClean="0"/>
+              <a:t>Abschlussübung Expert Level „Black Jack“</a:t>
+            </a:r>
+            <a:endParaRPr lang="en-US" dirty="0"/>
+          </a:p>
+        </p:txBody>
+      </p:sp>
+      <p:sp>
+        <p:nvSpPr>
+          <p:cNvPr id="3" name="Inhaltsplatzhalter 2"/>
+          <p:cNvSpPr>
+            <a:spLocks noGrp="1"/>
+          </p:cNvSpPr>
+          <p:nvPr>
+            <p:ph idx="1"/>
+          </p:nvPr>
+        </p:nvSpPr>
+        <p:spPr>
+          <a:xfrm>
+            <a:off x="1011116" y="2057400"/>
+            <a:ext cx="5926016" cy="4137259"/>
+          </a:xfrm>
+        </p:spPr>
+        <p:txBody>
+          <a:bodyPr>
+            <a:normAutofit fontScale="85000" lnSpcReduction="10000"/>
+          </a:bodyPr>
+          <a:lstStyle/>
+          <a:p>
+            <a:r>
+              <a:rPr lang="de-AT" dirty="0" smtClean="0"/>
+              <a:t>Schreibe eine Webanwendung um ein Black Jack Spiel zu simulieren, bei der ein Spieler Black Jack gegen die Bank spielt</a:t>
+            </a:r>
+          </a:p>
+          <a:p>
+            <a:pPr lvl="1"/>
+            <a:r>
+              <a:rPr lang="de-AT" dirty="0" smtClean="0"/>
+              <a:t>Der Spieler versucht so nahe wie möglich auf 21 zu kommen</a:t>
+            </a:r>
+          </a:p>
+          <a:p>
+            <a:pPr lvl="1"/>
+            <a:r>
+              <a:rPr lang="de-AT" dirty="0" smtClean="0"/>
+              <a:t>Die Bank zieht Karten, so lange bis sie 16 oder mehr auf der Hand hat</a:t>
+            </a:r>
+          </a:p>
+          <a:p>
+            <a:pPr lvl="1"/>
+            <a:r>
+              <a:rPr lang="de-AT" dirty="0" smtClean="0"/>
+              <a:t>Wenn Spieler oder Bank über 21 kommen, verlieren sie das Spiel</a:t>
+            </a:r>
+          </a:p>
+          <a:p>
+            <a:pPr lvl="1"/>
+            <a:r>
+              <a:rPr lang="de-AT" dirty="0" smtClean="0"/>
+              <a:t>Es gewinnt derjenige der näher an 21 dran ist </a:t>
+            </a:r>
+          </a:p>
+          <a:p>
+            <a:r>
+              <a:rPr lang="de-AT" dirty="0" smtClean="0"/>
+              <a:t>Der Spieler startet mit einem vorgegebenen </a:t>
+            </a:r>
+            <a:r>
+              <a:rPr lang="de-AT" dirty="0" err="1" smtClean="0"/>
+              <a:t>Chipstack</a:t>
+            </a:r>
+            <a:endParaRPr lang="de-AT" smtClean="0"/>
+          </a:p>
+          <a:p>
+            <a:r>
+              <a:rPr lang="de-AT" smtClean="0"/>
+              <a:t>In </a:t>
+            </a:r>
+            <a:r>
+              <a:rPr lang="de-AT" dirty="0" smtClean="0"/>
+              <a:t>jeder Runde wird ein fixer Einsatz seiner verfügbaren Chips eingesetzt</a:t>
+            </a:r>
+          </a:p>
+          <a:p>
+            <a:r>
+              <a:rPr lang="de-AT" dirty="0" smtClean="0"/>
+              <a:t>Der </a:t>
+            </a:r>
+            <a:r>
+              <a:rPr lang="de-AT" dirty="0" err="1" smtClean="0"/>
+              <a:t>Chipstack</a:t>
+            </a:r>
+            <a:r>
+              <a:rPr lang="de-AT" dirty="0" smtClean="0"/>
+              <a:t> des Spielers verändert sich nach jeder Runde</a:t>
+            </a:r>
+          </a:p>
+          <a:p>
+            <a:pPr lvl="1"/>
+            <a:r>
+              <a:rPr lang="de-AT" dirty="0" smtClean="0"/>
+              <a:t>Gewinnt der Spieler bekommt er seinen doppelten Einsatz zurück</a:t>
+            </a:r>
+          </a:p>
+          <a:p>
+            <a:pPr lvl="1"/>
+            <a:r>
+              <a:rPr lang="de-AT" dirty="0"/>
+              <a:t>V</a:t>
+            </a:r>
+            <a:r>
+              <a:rPr lang="de-AT" dirty="0" smtClean="0"/>
+              <a:t>erliert er die Runde verliert er auch seinen Einsatz</a:t>
+            </a:r>
+          </a:p>
+          <a:p>
+            <a:endParaRPr lang="en-US" dirty="0"/>
+          </a:p>
+        </p:txBody>
+      </p:sp>
+      <p:pic>
+        <p:nvPicPr>
+          <p:cNvPr id="4" name="Grafik 3"/>
+          <p:cNvPicPr>
+            <a:picLocks noChangeAspect="1"/>
+          </p:cNvPicPr>
+          <p:nvPr/>
+        </p:nvPicPr>
+        <p:blipFill>
+          <a:blip r:embed="rId2"/>
+          <a:stretch>
+            <a:fillRect/>
+          </a:stretch>
+        </p:blipFill>
+        <p:spPr>
+          <a:xfrm>
+            <a:off x="7376747" y="2147184"/>
+            <a:ext cx="4588116" cy="2947263"/>
+          </a:xfrm>
+          <a:prstGeom prst="rect">
+            <a:avLst/>
+          </a:prstGeom>
+        </p:spPr>
+      </p:pic>
+    </p:spTree>
+    <p:extLst>
+      <p:ext uri="{BB962C8B-B14F-4D97-AF65-F5344CB8AC3E}">
+        <p14:creationId xmlns:p14="http://schemas.microsoft.com/office/powerpoint/2010/main" val="3045681848"/>
+      </p:ext>
+    </p:extLst>
+  </p:cSld>
+  <p:clrMapOvr>
+    <a:masterClrMapping/>
+  </p:clrMapOvr>
+</p:sld>
+</file>
+
+<file path=ppt/slides/slide19.xml><?xml version="1.0" encoding="utf-8"?>
+<p:sld xmlns:a="http://schemas.openxmlformats.org/drawingml/2006/main" xmlns:r="http://schemas.openxmlformats.org/officeDocument/2006/relationships" xmlns:p="http://schemas.openxmlformats.org/presentationml/2006/main">
+  <p:cSld>
+    <p:spTree>
+      <p:nvGrpSpPr>
+        <p:cNvPr id="1" name=""/>
+        <p:cNvGrpSpPr/>
+        <p:nvPr/>
+      </p:nvGrpSpPr>
+      <p:grpSpPr>
+        <a:xfrm>
+          <a:off x="0" y="0"/>
+          <a:ext cx="0" cy="0"/>
+          <a:chOff x="0" y="0"/>
+          <a:chExt cx="0" cy="0"/>
+        </a:xfrm>
+      </p:grpSpPr>
+      <p:sp>
+        <p:nvSpPr>
           <p:cNvPr id="6" name="Titel 5">
             <a:extLst>
               <a:ext uri="{FF2B5EF4-FFF2-40B4-BE49-F238E27FC236}">
@@ -8130,6 +8335,13 @@
   <p:clrMapOvr>
     <a:masterClrMapping/>
   </p:clrMapOvr>
+  <p:timing>
+    <p:tnLst>
+      <p:par>
+        <p:cTn id="1" dur="indefinite" restart="never" nodeType="tmRoot"/>
+      </p:par>
+    </p:tnLst>
+  </p:timing>
 </p:sld>
 </file>
 
@@ -8221,7 +8433,6 @@
               <a:rPr lang="de-AT" dirty="0" smtClean="0"/>
               <a:t>Eingebunden</a:t>
             </a:r>
-            <a:endParaRPr lang="de-AT" dirty="0" smtClean="0"/>
           </a:p>
           <a:p>
             <a:r>
@@ -8337,6 +8548,13 @@
   <p:clrMapOvr>
     <a:masterClrMapping/>
   </p:clrMapOvr>
+  <p:timing>
+    <p:tnLst>
+      <p:par>
+        <p:cTn id="1" dur="indefinite" restart="never" nodeType="tmRoot"/>
+      </p:par>
+    </p:tnLst>
+  </p:timing>
 </p:sld>
 </file>
 
@@ -8540,6 +8758,13 @@
   <p:clrMapOvr>
     <a:masterClrMapping/>
   </p:clrMapOvr>
+  <p:timing>
+    <p:tnLst>
+      <p:par>
+        <p:cTn id="1" dur="indefinite" restart="never" nodeType="tmRoot"/>
+      </p:par>
+    </p:tnLst>
+  </p:timing>
 </p:sld>
 </file>
 
@@ -8729,6 +8954,13 @@
   <p:clrMapOvr>
     <a:masterClrMapping/>
   </p:clrMapOvr>
+  <p:timing>
+    <p:tnLst>
+      <p:par>
+        <p:cTn id="1" dur="indefinite" restart="never" nodeType="tmRoot"/>
+      </p:par>
+    </p:tnLst>
+  </p:timing>
 </p:sld>
 </file>
 

</xml_diff>